<commit_message>
fix indent gif slide
</commit_message>
<xml_diff>
--- a/Presentation.pptx
+++ b/Presentation.pptx
@@ -627,7 +627,7 @@
           <a:p>
             <a:fld id="{103BE25F-A7DE-45AC-A340-5D390290421E}" type="slidenum">
               <a:rPr lang="en-US"/>
-              <a:t>6</a:t>
+              <a:t>11</a:t>
             </a:fld>
             <a:endParaRPr lang="en-US"/>
           </a:p>
@@ -795,7 +795,7 @@
           <a:p>
             <a:fld id="{103BE25F-A7DE-45AC-A340-5D390290421E}" type="slidenum">
               <a:rPr lang="en-US"/>
-              <a:t>11</a:t>
+              <a:t>13</a:t>
             </a:fld>
             <a:endParaRPr lang="en-US"/>
           </a:p>
@@ -879,7 +879,7 @@
           <a:p>
             <a:fld id="{103BE25F-A7DE-45AC-A340-5D390290421E}" type="slidenum">
               <a:rPr lang="en-US"/>
-              <a:t>11</a:t>
+              <a:t>14</a:t>
             </a:fld>
             <a:endParaRPr lang="en-US"/>
           </a:p>
@@ -963,7 +963,7 @@
           <a:p>
             <a:fld id="{103BE25F-A7DE-45AC-A340-5D390290421E}" type="slidenum">
               <a:rPr lang="en-US"/>
-              <a:t>13</a:t>
+              <a:t>15</a:t>
             </a:fld>
             <a:endParaRPr lang="en-US"/>
           </a:p>
@@ -7270,7 +7270,7 @@
       </p:sp>
       <p:pic>
         <p:nvPicPr>
-          <p:cNvPr id="5" name="Picture 5" descr="move text.gif"/>
+          <p:cNvPr id="5" name="Picture 5" descr="indent-2-b7526f6de3.gif"/>
           <p:cNvPicPr>
             <a:picLocks noGrp="1" noChangeAspect="1"/>
           </p:cNvPicPr>
@@ -7286,8 +7286,8 @@
         </p:blipFill>
         <p:spPr>
           <a:xfrm>
-            <a:off x="1371600" y="1757654"/>
-            <a:ext cx="6087994" cy="4545702"/>
+            <a:off x="1378380" y="1757654"/>
+            <a:ext cx="6074434" cy="4545702"/>
           </a:xfrm>
           <a:prstGeom prst="rect">
             <a:avLst/>

</xml_diff>